<commit_message>
Seat Ul,Show time fetching and slide update
</commit_message>
<xml_diff>
--- a/Final Report/Online Movies Booking System.pptx
+++ b/Final Report/Online Movies Booking System.pptx
@@ -9,6 +9,8 @@
     <p:sldId id="257" r:id="rId3"/>
     <p:sldId id="259" r:id="rId4"/>
     <p:sldId id="258" r:id="rId5"/>
+    <p:sldId id="260" r:id="rId6"/>
+    <p:sldId id="261" r:id="rId7"/>
   </p:sldIdLst>
   <p:sldSz cx="12192000" cy="6858000"/>
   <p:notesSz cx="6858000" cy="9144000"/>
@@ -262,7 +264,7 @@
           <a:p>
             <a:fld id="{2E31331D-B07D-49AD-BF14-0474428CC626}" type="datetimeFigureOut">
               <a:rPr lang="en-US" smtClean="0"/>
-              <a:t>3/11/2019</a:t>
+              <a:t>3/12/2019</a:t>
             </a:fld>
             <a:endParaRPr lang="en-US"/>
           </a:p>
@@ -460,7 +462,7 @@
           <a:p>
             <a:fld id="{2E31331D-B07D-49AD-BF14-0474428CC626}" type="datetimeFigureOut">
               <a:rPr lang="en-US" smtClean="0"/>
-              <a:t>3/11/2019</a:t>
+              <a:t>3/12/2019</a:t>
             </a:fld>
             <a:endParaRPr lang="en-US"/>
           </a:p>
@@ -668,7 +670,7 @@
           <a:p>
             <a:fld id="{2E31331D-B07D-49AD-BF14-0474428CC626}" type="datetimeFigureOut">
               <a:rPr lang="en-US" smtClean="0"/>
-              <a:t>3/11/2019</a:t>
+              <a:t>3/12/2019</a:t>
             </a:fld>
             <a:endParaRPr lang="en-US"/>
           </a:p>
@@ -866,7 +868,7 @@
           <a:p>
             <a:fld id="{2E31331D-B07D-49AD-BF14-0474428CC626}" type="datetimeFigureOut">
               <a:rPr lang="en-US" smtClean="0"/>
-              <a:t>3/11/2019</a:t>
+              <a:t>3/12/2019</a:t>
             </a:fld>
             <a:endParaRPr lang="en-US"/>
           </a:p>
@@ -1141,7 +1143,7 @@
           <a:p>
             <a:fld id="{2E31331D-B07D-49AD-BF14-0474428CC626}" type="datetimeFigureOut">
               <a:rPr lang="en-US" smtClean="0"/>
-              <a:t>3/11/2019</a:t>
+              <a:t>3/12/2019</a:t>
             </a:fld>
             <a:endParaRPr lang="en-US"/>
           </a:p>
@@ -1406,7 +1408,7 @@
           <a:p>
             <a:fld id="{2E31331D-B07D-49AD-BF14-0474428CC626}" type="datetimeFigureOut">
               <a:rPr lang="en-US" smtClean="0"/>
-              <a:t>3/11/2019</a:t>
+              <a:t>3/12/2019</a:t>
             </a:fld>
             <a:endParaRPr lang="en-US"/>
           </a:p>
@@ -1818,7 +1820,7 @@
           <a:p>
             <a:fld id="{2E31331D-B07D-49AD-BF14-0474428CC626}" type="datetimeFigureOut">
               <a:rPr lang="en-US" smtClean="0"/>
-              <a:t>3/11/2019</a:t>
+              <a:t>3/12/2019</a:t>
             </a:fld>
             <a:endParaRPr lang="en-US"/>
           </a:p>
@@ -1959,7 +1961,7 @@
           <a:p>
             <a:fld id="{2E31331D-B07D-49AD-BF14-0474428CC626}" type="datetimeFigureOut">
               <a:rPr lang="en-US" smtClean="0"/>
-              <a:t>3/11/2019</a:t>
+              <a:t>3/12/2019</a:t>
             </a:fld>
             <a:endParaRPr lang="en-US"/>
           </a:p>
@@ -2072,7 +2074,7 @@
           <a:p>
             <a:fld id="{2E31331D-B07D-49AD-BF14-0474428CC626}" type="datetimeFigureOut">
               <a:rPr lang="en-US" smtClean="0"/>
-              <a:t>3/11/2019</a:t>
+              <a:t>3/12/2019</a:t>
             </a:fld>
             <a:endParaRPr lang="en-US"/>
           </a:p>
@@ -2383,7 +2385,7 @@
           <a:p>
             <a:fld id="{2E31331D-B07D-49AD-BF14-0474428CC626}" type="datetimeFigureOut">
               <a:rPr lang="en-US" smtClean="0"/>
-              <a:t>3/11/2019</a:t>
+              <a:t>3/12/2019</a:t>
             </a:fld>
             <a:endParaRPr lang="en-US"/>
           </a:p>
@@ -2671,7 +2673,7 @@
           <a:p>
             <a:fld id="{2E31331D-B07D-49AD-BF14-0474428CC626}" type="datetimeFigureOut">
               <a:rPr lang="en-US" smtClean="0"/>
-              <a:t>3/11/2019</a:t>
+              <a:t>3/12/2019</a:t>
             </a:fld>
             <a:endParaRPr lang="en-US"/>
           </a:p>
@@ -2912,7 +2914,7 @@
           <a:p>
             <a:fld id="{2E31331D-B07D-49AD-BF14-0474428CC626}" type="datetimeFigureOut">
               <a:rPr lang="en-US" smtClean="0"/>
-              <a:t>3/11/2019</a:t>
+              <a:t>3/12/2019</a:t>
             </a:fld>
             <a:endParaRPr lang="en-US"/>
           </a:p>
@@ -3739,6 +3741,191 @@
 </p:sld>
 </file>
 
+<file path=ppt/slides/slide5.xml><?xml version="1.0" encoding="utf-8"?>
+<p:sld xmlns:a="http://schemas.openxmlformats.org/drawingml/2006/main" xmlns:r="http://schemas.openxmlformats.org/officeDocument/2006/relationships" xmlns:p="http://schemas.openxmlformats.org/presentationml/2006/main">
+  <p:cSld>
+    <p:spTree>
+      <p:nvGrpSpPr>
+        <p:cNvPr id="1" name=""/>
+        <p:cNvGrpSpPr/>
+        <p:nvPr/>
+      </p:nvGrpSpPr>
+      <p:grpSpPr>
+        <a:xfrm>
+          <a:off x="0" y="0"/>
+          <a:ext cx="0" cy="0"/>
+          <a:chOff x="0" y="0"/>
+          <a:chExt cx="0" cy="0"/>
+        </a:xfrm>
+      </p:grpSpPr>
+      <p:sp>
+        <p:nvSpPr>
+          <p:cNvPr id="2" name="Title 1">
+            <a:extLst>
+              <a:ext uri="{FF2B5EF4-FFF2-40B4-BE49-F238E27FC236}">
+                <a16:creationId xmlns:a16="http://schemas.microsoft.com/office/drawing/2014/main" id="{9F1E623E-011D-4795-8506-DB3803F7B564}"/>
+              </a:ext>
+            </a:extLst>
+          </p:cNvPr>
+          <p:cNvSpPr>
+            <a:spLocks noGrp="1"/>
+          </p:cNvSpPr>
+          <p:nvPr>
+            <p:ph type="title"/>
+          </p:nvPr>
+        </p:nvSpPr>
+        <p:spPr/>
+        <p:txBody>
+          <a:bodyPr/>
+          <a:lstStyle/>
+          <a:p>
+            <a:r>
+              <a:rPr lang="en-US" dirty="0"/>
+              <a:t>Development </a:t>
+            </a:r>
+            <a:r>
+              <a:rPr lang="en-US" dirty="0" err="1"/>
+              <a:t>Methology</a:t>
+            </a:r>
+            <a:endParaRPr lang="en-US" dirty="0"/>
+          </a:p>
+        </p:txBody>
+      </p:sp>
+      <p:sp>
+        <p:nvSpPr>
+          <p:cNvPr id="3" name="Content Placeholder 2">
+            <a:extLst>
+              <a:ext uri="{FF2B5EF4-FFF2-40B4-BE49-F238E27FC236}">
+                <a16:creationId xmlns:a16="http://schemas.microsoft.com/office/drawing/2014/main" id="{276D0BA4-0E8F-4EB7-B666-469C83BC2436}"/>
+              </a:ext>
+            </a:extLst>
+          </p:cNvPr>
+          <p:cNvSpPr>
+            <a:spLocks noGrp="1"/>
+          </p:cNvSpPr>
+          <p:nvPr>
+            <p:ph idx="1"/>
+          </p:nvPr>
+        </p:nvSpPr>
+        <p:spPr/>
+        <p:txBody>
+          <a:bodyPr/>
+          <a:lstStyle/>
+          <a:p>
+            <a:r>
+              <a:rPr lang="en-US" dirty="0"/>
+              <a:t>I have used waterfall approach for this project. Waterfall model is first approach used in the software development. </a:t>
+            </a:r>
+          </a:p>
+        </p:txBody>
+      </p:sp>
+    </p:spTree>
+    <p:extLst>
+      <p:ext uri="{BB962C8B-B14F-4D97-AF65-F5344CB8AC3E}">
+        <p14:creationId xmlns:p14="http://schemas.microsoft.com/office/powerpoint/2010/main" val="2794931343"/>
+      </p:ext>
+    </p:extLst>
+  </p:cSld>
+  <p:clrMapOvr>
+    <a:masterClrMapping/>
+  </p:clrMapOvr>
+</p:sld>
+</file>
+
+<file path=ppt/slides/slide6.xml><?xml version="1.0" encoding="utf-8"?>
+<p:sld xmlns:a="http://schemas.openxmlformats.org/drawingml/2006/main" xmlns:r="http://schemas.openxmlformats.org/officeDocument/2006/relationships" xmlns:p="http://schemas.openxmlformats.org/presentationml/2006/main">
+  <p:cSld>
+    <p:spTree>
+      <p:nvGrpSpPr>
+        <p:cNvPr id="1" name=""/>
+        <p:cNvGrpSpPr/>
+        <p:nvPr/>
+      </p:nvGrpSpPr>
+      <p:grpSpPr>
+        <a:xfrm>
+          <a:off x="0" y="0"/>
+          <a:ext cx="0" cy="0"/>
+          <a:chOff x="0" y="0"/>
+          <a:chExt cx="0" cy="0"/>
+        </a:xfrm>
+      </p:grpSpPr>
+      <p:sp>
+        <p:nvSpPr>
+          <p:cNvPr id="2" name="Title 1">
+            <a:extLst>
+              <a:ext uri="{FF2B5EF4-FFF2-40B4-BE49-F238E27FC236}">
+                <a16:creationId xmlns:a16="http://schemas.microsoft.com/office/drawing/2014/main" id="{A9CB7258-7159-42B9-8CBB-95BDCEFB8AED}"/>
+              </a:ext>
+            </a:extLst>
+          </p:cNvPr>
+          <p:cNvSpPr>
+            <a:spLocks noGrp="1"/>
+          </p:cNvSpPr>
+          <p:nvPr>
+            <p:ph type="title"/>
+          </p:nvPr>
+        </p:nvSpPr>
+        <p:spPr/>
+        <p:txBody>
+          <a:bodyPr/>
+          <a:lstStyle/>
+          <a:p>
+            <a:r>
+              <a:rPr lang="en-US" dirty="0" err="1"/>
+              <a:t>Cont</a:t>
+            </a:r>
+            <a:r>
+              <a:rPr lang="en-US" dirty="0"/>
+              <a:t>…</a:t>
+            </a:r>
+          </a:p>
+        </p:txBody>
+      </p:sp>
+      <p:pic>
+        <p:nvPicPr>
+          <p:cNvPr id="4" name="Content Placeholder 3">
+            <a:extLst>
+              <a:ext uri="{FF2B5EF4-FFF2-40B4-BE49-F238E27FC236}">
+                <a16:creationId xmlns:a16="http://schemas.microsoft.com/office/drawing/2014/main" id="{396C0015-1DCA-4A1E-BED4-51DBA70030E4}"/>
+              </a:ext>
+            </a:extLst>
+          </p:cNvPr>
+          <p:cNvPicPr>
+            <a:picLocks noGrp="1"/>
+          </p:cNvPicPr>
+          <p:nvPr>
+            <p:ph idx="1"/>
+          </p:nvPr>
+        </p:nvPicPr>
+        <p:blipFill>
+          <a:blip r:embed="rId2"/>
+          <a:stretch>
+            <a:fillRect/>
+          </a:stretch>
+        </p:blipFill>
+        <p:spPr>
+          <a:xfrm>
+            <a:off x="3576637" y="2305844"/>
+            <a:ext cx="5038725" cy="3390900"/>
+          </a:xfrm>
+          <a:prstGeom prst="rect">
+            <a:avLst/>
+          </a:prstGeom>
+        </p:spPr>
+      </p:pic>
+    </p:spTree>
+    <p:extLst>
+      <p:ext uri="{BB962C8B-B14F-4D97-AF65-F5344CB8AC3E}">
+        <p14:creationId xmlns:p14="http://schemas.microsoft.com/office/powerpoint/2010/main" val="4098663565"/>
+      </p:ext>
+    </p:extLst>
+  </p:cSld>
+  <p:clrMapOvr>
+    <a:masterClrMapping/>
+  </p:clrMapOvr>
+</p:sld>
+</file>
+
 <file path=ppt/theme/theme1.xml><?xml version="1.0" encoding="utf-8"?>
 <a:theme xmlns:a="http://schemas.openxmlformats.org/drawingml/2006/main" name="Office Theme">
   <a:themeElements>

</xml_diff>

<commit_message>
Movies update and footer design
</commit_message>
<xml_diff>
--- a/Final Report/Online Movies Booking System.pptx
+++ b/Final Report/Online Movies Booking System.pptx
@@ -264,7 +264,7 @@
           <a:p>
             <a:fld id="{2E31331D-B07D-49AD-BF14-0474428CC626}" type="datetimeFigureOut">
               <a:rPr lang="en-US" smtClean="0"/>
-              <a:t>3/12/2019</a:t>
+              <a:t>3/28/2019</a:t>
             </a:fld>
             <a:endParaRPr lang="en-US"/>
           </a:p>
@@ -462,7 +462,7 @@
           <a:p>
             <a:fld id="{2E31331D-B07D-49AD-BF14-0474428CC626}" type="datetimeFigureOut">
               <a:rPr lang="en-US" smtClean="0"/>
-              <a:t>3/12/2019</a:t>
+              <a:t>3/28/2019</a:t>
             </a:fld>
             <a:endParaRPr lang="en-US"/>
           </a:p>
@@ -670,7 +670,7 @@
           <a:p>
             <a:fld id="{2E31331D-B07D-49AD-BF14-0474428CC626}" type="datetimeFigureOut">
               <a:rPr lang="en-US" smtClean="0"/>
-              <a:t>3/12/2019</a:t>
+              <a:t>3/28/2019</a:t>
             </a:fld>
             <a:endParaRPr lang="en-US"/>
           </a:p>
@@ -868,7 +868,7 @@
           <a:p>
             <a:fld id="{2E31331D-B07D-49AD-BF14-0474428CC626}" type="datetimeFigureOut">
               <a:rPr lang="en-US" smtClean="0"/>
-              <a:t>3/12/2019</a:t>
+              <a:t>3/28/2019</a:t>
             </a:fld>
             <a:endParaRPr lang="en-US"/>
           </a:p>
@@ -1143,7 +1143,7 @@
           <a:p>
             <a:fld id="{2E31331D-B07D-49AD-BF14-0474428CC626}" type="datetimeFigureOut">
               <a:rPr lang="en-US" smtClean="0"/>
-              <a:t>3/12/2019</a:t>
+              <a:t>3/28/2019</a:t>
             </a:fld>
             <a:endParaRPr lang="en-US"/>
           </a:p>
@@ -1408,7 +1408,7 @@
           <a:p>
             <a:fld id="{2E31331D-B07D-49AD-BF14-0474428CC626}" type="datetimeFigureOut">
               <a:rPr lang="en-US" smtClean="0"/>
-              <a:t>3/12/2019</a:t>
+              <a:t>3/28/2019</a:t>
             </a:fld>
             <a:endParaRPr lang="en-US"/>
           </a:p>
@@ -1820,7 +1820,7 @@
           <a:p>
             <a:fld id="{2E31331D-B07D-49AD-BF14-0474428CC626}" type="datetimeFigureOut">
               <a:rPr lang="en-US" smtClean="0"/>
-              <a:t>3/12/2019</a:t>
+              <a:t>3/28/2019</a:t>
             </a:fld>
             <a:endParaRPr lang="en-US"/>
           </a:p>
@@ -1961,7 +1961,7 @@
           <a:p>
             <a:fld id="{2E31331D-B07D-49AD-BF14-0474428CC626}" type="datetimeFigureOut">
               <a:rPr lang="en-US" smtClean="0"/>
-              <a:t>3/12/2019</a:t>
+              <a:t>3/28/2019</a:t>
             </a:fld>
             <a:endParaRPr lang="en-US"/>
           </a:p>
@@ -2074,7 +2074,7 @@
           <a:p>
             <a:fld id="{2E31331D-B07D-49AD-BF14-0474428CC626}" type="datetimeFigureOut">
               <a:rPr lang="en-US" smtClean="0"/>
-              <a:t>3/12/2019</a:t>
+              <a:t>3/28/2019</a:t>
             </a:fld>
             <a:endParaRPr lang="en-US"/>
           </a:p>
@@ -2385,7 +2385,7 @@
           <a:p>
             <a:fld id="{2E31331D-B07D-49AD-BF14-0474428CC626}" type="datetimeFigureOut">
               <a:rPr lang="en-US" smtClean="0"/>
-              <a:t>3/12/2019</a:t>
+              <a:t>3/28/2019</a:t>
             </a:fld>
             <a:endParaRPr lang="en-US"/>
           </a:p>
@@ -2673,7 +2673,7 @@
           <a:p>
             <a:fld id="{2E31331D-B07D-49AD-BF14-0474428CC626}" type="datetimeFigureOut">
               <a:rPr lang="en-US" smtClean="0"/>
-              <a:t>3/12/2019</a:t>
+              <a:t>3/28/2019</a:t>
             </a:fld>
             <a:endParaRPr lang="en-US"/>
           </a:p>
@@ -2914,7 +2914,7 @@
           <a:p>
             <a:fld id="{2E31331D-B07D-49AD-BF14-0474428CC626}" type="datetimeFigureOut">
               <a:rPr lang="en-US" smtClean="0"/>
-              <a:t>3/12/2019</a:t>
+              <a:t>3/28/2019</a:t>
             </a:fld>
             <a:endParaRPr lang="en-US"/>
           </a:p>
@@ -3349,13 +3349,13 @@
         </p:nvSpPr>
         <p:spPr>
           <a:xfrm>
-            <a:off x="1179443" y="438576"/>
-            <a:ext cx="9594574" cy="1013373"/>
+            <a:off x="1391275" y="140678"/>
+            <a:ext cx="9409450" cy="2002866"/>
           </a:xfrm>
         </p:spPr>
         <p:txBody>
           <a:bodyPr>
-            <a:normAutofit/>
+            <a:normAutofit fontScale="90000"/>
           </a:bodyPr>
           <a:lstStyle/>
           <a:p>
@@ -3367,6 +3367,20 @@
               <a:rPr lang="en-US" b="1" dirty="0"/>
               <a:t>nline Movies Booking System</a:t>
             </a:r>
+            <a:br>
+              <a:rPr lang="en-US" b="1" dirty="0"/>
+            </a:br>
+            <a:r>
+              <a:rPr lang="en-US" sz="4400" b="1" dirty="0"/>
+              <a:t>Web Application</a:t>
+            </a:r>
+            <a:br>
+              <a:rPr lang="en-US" b="1" dirty="0"/>
+            </a:br>
+            <a:r>
+              <a:rPr lang="en-US" b="1" dirty="0"/>
+              <a:t>                   </a:t>
+            </a:r>
             <a:endParaRPr lang="en-US" dirty="0"/>
           </a:p>
         </p:txBody>
@@ -3389,19 +3403,49 @@
         </p:nvSpPr>
         <p:spPr>
           <a:xfrm>
-            <a:off x="2663687" y="3355694"/>
-            <a:ext cx="7315200" cy="410818"/>
+            <a:off x="4267200" y="5416826"/>
+            <a:ext cx="7315200" cy="337512"/>
           </a:xfrm>
         </p:spPr>
         <p:txBody>
           <a:bodyPr>
-            <a:normAutofit lnSpcReduction="10000"/>
+            <a:normAutofit fontScale="25000" lnSpcReduction="20000"/>
           </a:bodyPr>
           <a:lstStyle/>
           <a:p>
             <a:r>
               <a:rPr lang="en-US" dirty="0"/>
-              <a:t>                                                           Using Laravel and MySQL</a:t>
+              <a:t>                                                          </a:t>
+            </a:r>
+            <a:r>
+              <a:rPr lang="en-US" sz="9600" dirty="0"/>
+              <a:t> </a:t>
+            </a:r>
+            <a:r>
+              <a:rPr lang="en-US" sz="9600" dirty="0" err="1"/>
+              <a:t>Name:Ashish</a:t>
+            </a:r>
+            <a:r>
+              <a:rPr lang="en-US" sz="9600" dirty="0"/>
+              <a:t> Pokhrel</a:t>
+            </a:r>
+          </a:p>
+          <a:p>
+            <a:r>
+              <a:rPr lang="en-US" sz="9600" dirty="0"/>
+              <a:t>              00172912</a:t>
+            </a:r>
+          </a:p>
+          <a:p>
+            <a:endParaRPr lang="en-US" sz="9600" dirty="0"/>
+          </a:p>
+          <a:p>
+            <a:endParaRPr lang="en-US" sz="9600" dirty="0"/>
+          </a:p>
+          <a:p>
+            <a:r>
+              <a:rPr lang="en-US" dirty="0"/>
+              <a:t> </a:t>
             </a:r>
           </a:p>
         </p:txBody>
@@ -3433,8 +3477,8 @@
         </p:blipFill>
         <p:spPr bwMode="auto">
           <a:xfrm>
-            <a:off x="4590015" y="1451949"/>
-            <a:ext cx="2804698" cy="1476781"/>
+            <a:off x="4084320" y="2143544"/>
+            <a:ext cx="3840480" cy="2114140"/>
           </a:xfrm>
           <a:prstGeom prst="rect">
             <a:avLst/>
@@ -3528,6 +3572,15 @@
               <a:rPr lang="en-US" dirty="0"/>
               <a:t>Online movies Booking System is a web portal where user can easily book ticket for movies through online.</a:t>
             </a:r>
+          </a:p>
+          <a:p>
+            <a:r>
+              <a:rPr lang="en-US" dirty="0"/>
+              <a:t>Online movie Booking System  is basically made from providing  the customers an anytime and anywhere to book seat for cinemas.</a:t>
+            </a:r>
+          </a:p>
+          <a:p>
+            <a:endParaRPr lang="en-US" dirty="0"/>
           </a:p>
         </p:txBody>
       </p:sp>

</xml_diff>